<commit_message>
Adding Session 3 notebook and updating solved environment
</commit_message>
<xml_diff>
--- a/Machine Learning Development with Python.pptx
+++ b/Machine Learning Development with Python.pptx
@@ -5,10 +5,10 @@
     <p:sldMasterId id="2147483725" r:id="rId1"/>
   </p:sldMasterIdLst>
   <p:notesMasterIdLst>
-    <p:notesMasterId r:id="rId23"/>
+    <p:notesMasterId r:id="rId26"/>
   </p:notesMasterIdLst>
   <p:handoutMasterIdLst>
-    <p:handoutMasterId r:id="rId24"/>
+    <p:handoutMasterId r:id="rId27"/>
   </p:handoutMasterIdLst>
   <p:sldIdLst>
     <p:sldId id="256" r:id="rId2"/>
@@ -30,8 +30,11 @@
     <p:sldId id="293" r:id="rId18"/>
     <p:sldId id="294" r:id="rId19"/>
     <p:sldId id="295" r:id="rId20"/>
-    <p:sldId id="302" r:id="rId21"/>
-    <p:sldId id="301" r:id="rId22"/>
+    <p:sldId id="306" r:id="rId21"/>
+    <p:sldId id="304" r:id="rId22"/>
+    <p:sldId id="305" r:id="rId23"/>
+    <p:sldId id="307" r:id="rId24"/>
+    <p:sldId id="301" r:id="rId25"/>
   </p:sldIdLst>
   <p:sldSz cx="12192000" cy="6858000"/>
   <p:notesSz cx="6858000" cy="9144000"/>
@@ -254,7 +257,7 @@
             <a:pPr rtl="0"/>
             <a:fld id="{86BDAACC-EE54-48C0-92FC-61DB384E2706}" type="datetime1">
               <a:rPr lang="pt-PT" smtClean="0"/>
-              <a:t>13/04/2023</a:t>
+              <a:t>18/04/2023</a:t>
             </a:fld>
             <a:endParaRPr lang="pt-PT"/>
           </a:p>
@@ -436,7 +439,7 @@
             <a:pPr rtl="0"/>
             <a:fld id="{6CCB5EDB-61D4-446D-B1C2-DFD9E258A11A}" type="datetime1">
               <a:rPr lang="pt-PT" noProof="0" smtClean="0"/>
-              <a:t>13/04/2023</a:t>
+              <a:t>18/04/2023</a:t>
             </a:fld>
             <a:endParaRPr lang="pt-PT" noProof="0"/>
           </a:p>
@@ -1037,7 +1040,7 @@
             <a:pPr rtl="0"/>
             <a:fld id="{FD706A6C-A749-434E-9E08-4A4FDAFB4679}" type="datetime1">
               <a:rPr lang="pt-PT" noProof="0" smtClean="0"/>
-              <a:t>13/04/2023</a:t>
+              <a:t>18/04/2023</a:t>
             </a:fld>
             <a:endParaRPr lang="pt-PT" noProof="0"/>
           </a:p>
@@ -1380,7 +1383,7 @@
             <a:pPr rtl="0"/>
             <a:fld id="{6FE3B8E0-84BB-43A6-BBCA-00C54D522C41}" type="datetime1">
               <a:rPr lang="pt-PT" noProof="0" smtClean="0"/>
-              <a:t>13/04/2023</a:t>
+              <a:t>18/04/2023</a:t>
             </a:fld>
             <a:endParaRPr lang="pt-PT" noProof="0"/>
           </a:p>
@@ -1807,7 +1810,7 @@
             <a:pPr rtl="0"/>
             <a:fld id="{B0626C17-FF92-43FD-923A-2FCE9463FAB3}" type="datetime1">
               <a:rPr lang="pt-PT" noProof="0" smtClean="0"/>
-              <a:t>13/04/2023</a:t>
+              <a:t>18/04/2023</a:t>
             </a:fld>
             <a:endParaRPr lang="pt-PT" noProof="0"/>
           </a:p>
@@ -2071,7 +2074,7 @@
             <a:pPr rtl="0"/>
             <a:fld id="{B854CE65-D76E-4369-9D99-4FB2AC6C35AF}" type="datetime1">
               <a:rPr lang="pt-PT" noProof="0" smtClean="0"/>
-              <a:t>13/04/2023</a:t>
+              <a:t>18/04/2023</a:t>
             </a:fld>
             <a:endParaRPr lang="pt-PT" noProof="0"/>
           </a:p>
@@ -2459,7 +2462,7 @@
             <a:pPr rtl="0"/>
             <a:fld id="{21EC7BC7-14C4-4C57-B837-EBA7D39351BB}" type="datetime1">
               <a:rPr lang="pt-PT" noProof="0" smtClean="0"/>
-              <a:t>13/04/2023</a:t>
+              <a:t>18/04/2023</a:t>
             </a:fld>
             <a:endParaRPr lang="pt-PT" noProof="0"/>
           </a:p>
@@ -2600,7 +2603,7 @@
             <a:pPr rtl="0"/>
             <a:fld id="{6F05EFB6-C9EA-4847-B5A6-D5FE542E7B1B}" type="datetime1">
               <a:rPr lang="pt-PT" noProof="0" smtClean="0"/>
-              <a:t>13/04/2023</a:t>
+              <a:t>18/04/2023</a:t>
             </a:fld>
             <a:endParaRPr lang="pt-PT" noProof="0"/>
           </a:p>
@@ -3114,7 +3117,7 @@
             <a:pPr rtl="0"/>
             <a:fld id="{4C72A2CC-B616-45CE-823F-39416A6F9339}" type="datetime1">
               <a:rPr lang="pt-PT" noProof="0" smtClean="0"/>
-              <a:t>13/04/2023</a:t>
+              <a:t>18/04/2023</a:t>
             </a:fld>
             <a:endParaRPr lang="pt-PT" noProof="0"/>
           </a:p>
@@ -3342,7 +3345,7 @@
             <a:pPr rtl="0"/>
             <a:fld id="{310989F7-539A-4CF1-9535-C9128EAC816F}" type="datetime1">
               <a:rPr lang="pt-PT" noProof="0" smtClean="0"/>
-              <a:t>13/04/2023</a:t>
+              <a:t>18/04/2023</a:t>
             </a:fld>
             <a:endParaRPr lang="pt-PT" noProof="0"/>
           </a:p>
@@ -3483,7 +3486,7 @@
             <a:pPr rtl="0"/>
             <a:fld id="{BF42CA73-1415-4E9B-86EC-E98A21CBE999}" type="datetime1">
               <a:rPr lang="pt-PT" noProof="0" smtClean="0"/>
-              <a:t>13/04/2023</a:t>
+              <a:t>18/04/2023</a:t>
             </a:fld>
             <a:endParaRPr lang="pt-PT" noProof="0"/>
           </a:p>
@@ -3919,7 +3922,7 @@
             <a:pPr rtl="0"/>
             <a:fld id="{0563587E-C1D0-4121-A7B1-1DF7DEAB86CA}" type="datetime1">
               <a:rPr lang="pt-PT" noProof="0" smtClean="0"/>
-              <a:t>13/04/2023</a:t>
+              <a:t>18/04/2023</a:t>
             </a:fld>
             <a:endParaRPr lang="pt-PT" noProof="0"/>
           </a:p>
@@ -4527,7 +4530,7 @@
             <a:pPr rtl="0"/>
             <a:fld id="{A169654B-8B51-485C-802A-C79F6ACCD3E8}" type="datetime1">
               <a:rPr lang="pt-PT" noProof="0" smtClean="0"/>
-              <a:t>13/04/2023</a:t>
+              <a:t>18/04/2023</a:t>
             </a:fld>
             <a:endParaRPr lang="pt-PT" noProof="0"/>
           </a:p>
@@ -4870,7 +4873,7 @@
             <a:pPr rtl="0"/>
             <a:fld id="{5E084554-5108-487E-944F-F827B50618D8}" type="datetime1">
               <a:rPr lang="pt-PT" noProof="0" smtClean="0"/>
-              <a:t>13/04/2023</a:t>
+              <a:t>18/04/2023</a:t>
             </a:fld>
             <a:endParaRPr lang="pt-PT" noProof="0"/>
           </a:p>
@@ -5177,7 +5180,7 @@
             <a:pPr rtl="0"/>
             <a:fld id="{239F7AB8-AC99-414F-8745-6123495EECAC}" type="datetime1">
               <a:rPr lang="pt-PT" noProof="0" smtClean="0"/>
-              <a:t>13/04/2023</a:t>
+              <a:t>18/04/2023</a:t>
             </a:fld>
             <a:endParaRPr lang="pt-PT" noProof="0"/>
           </a:p>
@@ -13078,8 +13081,8 @@
           </a:prstGeom>
         </p:spPr>
       </p:pic>
-      <mc:AlternateContent xmlns:mc="http://schemas.openxmlformats.org/markup-compatibility/2006">
-        <mc:Choice xmlns:a14="http://schemas.microsoft.com/office/drawing/2010/main" Requires="a14">
+      <mc:AlternateContent xmlns:mc="http://schemas.openxmlformats.org/markup-compatibility/2006" xmlns:a14="http://schemas.microsoft.com/office/drawing/2010/main">
+        <mc:Choice Requires="a14">
           <p:sp>
             <p:nvSpPr>
               <p:cNvPr id="13" name="Marcador de Posição de Conteúdo 5">
@@ -14042,7 +14045,7 @@
             </p:txBody>
           </p:sp>
         </mc:Choice>
-        <mc:Fallback>
+        <mc:Fallback xmlns="">
           <p:sp>
             <p:nvSpPr>
               <p:cNvPr id="13" name="Marcador de Posição de Conteúdo 5">
@@ -16854,7 +16857,7 @@
     </p:spTree>
     <p:extLst>
       <p:ext uri="{BB962C8B-B14F-4D97-AF65-F5344CB8AC3E}">
-        <p14:creationId xmlns:p14="http://schemas.microsoft.com/office/powerpoint/2010/main" val="2093387929"/>
+        <p14:creationId xmlns:p14="http://schemas.microsoft.com/office/powerpoint/2010/main" val="2402366901"/>
       </p:ext>
     </p:extLst>
   </p:cSld>
@@ -16964,12 +16967,59 @@
           <a:chExt cx="0" cy="0"/>
         </a:xfrm>
       </p:grpSpPr>
-      <p:sp>
-        <p:nvSpPr>
-          <p:cNvPr id="5" name="Marcador de Posição do Número do Diapositivo 4">
+      <p:pic>
+        <p:nvPicPr>
+          <p:cNvPr id="7" name="Picture 2" descr="Ensemble Methods in Machine Learning: Bagging Versus Boosting | Pluralsight">
             <a:extLst>
               <a:ext uri="{FF2B5EF4-FFF2-40B4-BE49-F238E27FC236}">
-                <a16:creationId xmlns:a16="http://schemas.microsoft.com/office/drawing/2014/main" id="{3FD45999-342A-6E84-C532-DF49E8B49CC5}"/>
+                <a16:creationId xmlns:a16="http://schemas.microsoft.com/office/drawing/2014/main" id="{63DF4119-CDA4-D1D7-0C30-38F574C68CA2}"/>
+              </a:ext>
+            </a:extLst>
+          </p:cNvPr>
+          <p:cNvPicPr>
+            <a:picLocks noChangeAspect="1" noChangeArrowheads="1"/>
+          </p:cNvPicPr>
+          <p:nvPr/>
+        </p:nvPicPr>
+        <p:blipFill>
+          <a:blip r:embed="rId2">
+            <a:extLst>
+              <a:ext uri="{28A0092B-C50C-407E-A947-70E740481C1C}">
+                <a14:useLocalDpi xmlns:a14="http://schemas.microsoft.com/office/drawing/2010/main" val="0"/>
+              </a:ext>
+            </a:extLst>
+          </a:blip>
+          <a:srcRect/>
+          <a:stretch>
+            <a:fillRect/>
+          </a:stretch>
+        </p:blipFill>
+        <p:spPr bwMode="auto">
+          <a:xfrm>
+            <a:off x="5935990" y="2690112"/>
+            <a:ext cx="5674816" cy="3255224"/>
+          </a:xfrm>
+          <a:prstGeom prst="rect">
+            <a:avLst/>
+          </a:prstGeom>
+          <a:noFill/>
+          <a:extLst>
+            <a:ext uri="{909E8E84-426E-40DD-AFC4-6F175D3DCCD1}">
+              <a14:hiddenFill xmlns:a14="http://schemas.microsoft.com/office/drawing/2010/main">
+                <a:solidFill>
+                  <a:srgbClr val="FFFFFF"/>
+                </a:solidFill>
+              </a14:hiddenFill>
+            </a:ext>
+          </a:extLst>
+        </p:spPr>
+      </p:pic>
+      <p:sp>
+        <p:nvSpPr>
+          <p:cNvPr id="2" name="Marcador de Posição do Número do Diapositivo 1">
+            <a:extLst>
+              <a:ext uri="{FF2B5EF4-FFF2-40B4-BE49-F238E27FC236}">
+                <a16:creationId xmlns:a16="http://schemas.microsoft.com/office/drawing/2014/main" id="{9C448F08-AE35-AC87-F203-23F7D7B8E6B3}"/>
               </a:ext>
             </a:extLst>
           </p:cNvPr>
@@ -16986,9 +17036,802 @@
           <a:lstStyle/>
           <a:p>
             <a:pPr rtl="0"/>
+            <a:fld id="{F603CDE5-C1D8-4EDD-870F-A498BAFA520F}" type="slidenum">
+              <a:rPr lang="pt-PT" noProof="0" smtClean="0"/>
+              <a:t>21</a:t>
+            </a:fld>
+            <a:endParaRPr lang="pt-PT" noProof="0"/>
+          </a:p>
+        </p:txBody>
+      </p:sp>
+      <p:sp>
+        <p:nvSpPr>
+          <p:cNvPr id="3" name="Marcador de Posição do Rodapé 2">
+            <a:extLst>
+              <a:ext uri="{FF2B5EF4-FFF2-40B4-BE49-F238E27FC236}">
+                <a16:creationId xmlns:a16="http://schemas.microsoft.com/office/drawing/2014/main" id="{20E17078-2635-B6C6-1C8A-CAABA3039C85}"/>
+              </a:ext>
+            </a:extLst>
+          </p:cNvPr>
+          <p:cNvSpPr>
+            <a:spLocks noGrp="1"/>
+          </p:cNvSpPr>
+          <p:nvPr>
+            <p:ph type="ftr" sz="quarter" idx="11"/>
+          </p:nvPr>
+        </p:nvSpPr>
+        <p:spPr/>
+        <p:txBody>
+          <a:bodyPr/>
+          <a:lstStyle/>
+          <a:p>
+            <a:r>
+              <a:rPr lang="en-US" noProof="0" dirty="0"/>
+              <a:t>Machine Learning Development with Python</a:t>
+            </a:r>
+            <a:endParaRPr lang="pt-PT" noProof="0" dirty="0"/>
+          </a:p>
+        </p:txBody>
+      </p:sp>
+      <p:sp>
+        <p:nvSpPr>
+          <p:cNvPr id="4" name="Título 3">
+            <a:extLst>
+              <a:ext uri="{FF2B5EF4-FFF2-40B4-BE49-F238E27FC236}">
+                <a16:creationId xmlns:a16="http://schemas.microsoft.com/office/drawing/2014/main" id="{07CE9088-B8FA-2230-8155-33315E9C00F3}"/>
+              </a:ext>
+            </a:extLst>
+          </p:cNvPr>
+          <p:cNvSpPr>
+            <a:spLocks noGrp="1"/>
+          </p:cNvSpPr>
+          <p:nvPr>
+            <p:ph type="title"/>
+          </p:nvPr>
+        </p:nvSpPr>
+        <p:spPr/>
+        <p:txBody>
+          <a:bodyPr/>
+          <a:lstStyle/>
+          <a:p>
+            <a:r>
+              <a:rPr lang="pt-PT" i="1" dirty="0"/>
+              <a:t>Ensemble learning: </a:t>
+            </a:r>
+            <a:r>
+              <a:rPr lang="pt-PT" i="1" dirty="0" err="1"/>
+              <a:t>bagging</a:t>
+            </a:r>
+            <a:r>
+              <a:rPr lang="pt-PT" i="1" dirty="0"/>
+              <a:t> &amp; boosting</a:t>
+            </a:r>
+            <a:endParaRPr lang="pt-PT" dirty="0"/>
+          </a:p>
+        </p:txBody>
+      </p:sp>
+      <p:sp>
+        <p:nvSpPr>
+          <p:cNvPr id="5" name="Marcador de Posição do Texto 4">
+            <a:extLst>
+              <a:ext uri="{FF2B5EF4-FFF2-40B4-BE49-F238E27FC236}">
+                <a16:creationId xmlns:a16="http://schemas.microsoft.com/office/drawing/2014/main" id="{7B687AD8-CC73-922C-A5D1-6853D752B537}"/>
+              </a:ext>
+            </a:extLst>
+          </p:cNvPr>
+          <p:cNvSpPr>
+            <a:spLocks noGrp="1"/>
+          </p:cNvSpPr>
+          <p:nvPr>
+            <p:ph type="body" idx="1"/>
+          </p:nvPr>
+        </p:nvSpPr>
+        <p:spPr/>
+        <p:txBody>
+          <a:bodyPr/>
+          <a:lstStyle/>
+          <a:p>
+            <a:r>
+              <a:rPr lang="pt-PT" dirty="0" err="1"/>
+              <a:t>Bagging</a:t>
+            </a:r>
+            <a:endParaRPr lang="pt-PT" dirty="0"/>
+          </a:p>
+        </p:txBody>
+      </p:sp>
+      <p:sp>
+        <p:nvSpPr>
+          <p:cNvPr id="6" name="Marcador de Posição de Conteúdo 5">
+            <a:extLst>
+              <a:ext uri="{FF2B5EF4-FFF2-40B4-BE49-F238E27FC236}">
+                <a16:creationId xmlns:a16="http://schemas.microsoft.com/office/drawing/2014/main" id="{72B598D9-E7B8-17AA-8B64-DC76C3DD318E}"/>
+              </a:ext>
+            </a:extLst>
+          </p:cNvPr>
+          <p:cNvSpPr>
+            <a:spLocks noGrp="1"/>
+          </p:cNvSpPr>
+          <p:nvPr>
+            <p:ph sz="half" idx="2"/>
+          </p:nvPr>
+        </p:nvSpPr>
+        <p:spPr>
+          <a:xfrm>
+            <a:off x="581194" y="2926051"/>
+            <a:ext cx="5393100" cy="3255223"/>
+          </a:xfrm>
+        </p:spPr>
+        <p:txBody>
+          <a:bodyPr>
+            <a:normAutofit/>
+          </a:bodyPr>
+          <a:lstStyle/>
+          <a:p>
+            <a:r>
+              <a:rPr lang="pt-PT" dirty="0"/>
+              <a:t>Treinamos o mesmo tipo de modelo em diferentes subconjuntos de treino (</a:t>
+            </a:r>
+            <a:r>
+              <a:rPr lang="pt-PT" i="1" dirty="0" err="1"/>
+              <a:t>bootstrap</a:t>
+            </a:r>
+            <a:r>
+              <a:rPr lang="pt-PT" dirty="0"/>
+              <a:t>).</a:t>
+            </a:r>
+          </a:p>
+          <a:p>
+            <a:r>
+              <a:rPr lang="pt-PT" dirty="0"/>
+              <a:t>A previsão final será:</a:t>
+            </a:r>
+          </a:p>
+          <a:p>
+            <a:pPr lvl="1"/>
+            <a:r>
+              <a:rPr lang="pt-PT" dirty="0"/>
+              <a:t>A média das previsões de cada modelo no caso de uma regressão;</a:t>
+            </a:r>
+          </a:p>
+          <a:p>
+            <a:pPr lvl="1"/>
+            <a:r>
+              <a:rPr lang="pt-PT" dirty="0"/>
+              <a:t>A classe com maioria de votos no caso da classificação.</a:t>
+            </a:r>
+          </a:p>
+          <a:p>
+            <a:r>
+              <a:rPr lang="pt-PT" dirty="0"/>
+              <a:t>Exemplo: Florestas Aleatórias (</a:t>
+            </a:r>
+            <a:r>
+              <a:rPr lang="pt-PT" i="1" dirty="0"/>
+              <a:t>Random </a:t>
+            </a:r>
+            <a:r>
+              <a:rPr lang="pt-PT" i="1" dirty="0" err="1"/>
+              <a:t>Forests</a:t>
+            </a:r>
+            <a:r>
+              <a:rPr lang="pt-PT" dirty="0"/>
+              <a:t>)</a:t>
+            </a:r>
+          </a:p>
+        </p:txBody>
+      </p:sp>
+    </p:spTree>
+    <p:extLst>
+      <p:ext uri="{BB962C8B-B14F-4D97-AF65-F5344CB8AC3E}">
+        <p14:creationId xmlns:p14="http://schemas.microsoft.com/office/powerpoint/2010/main" val="439783446"/>
+      </p:ext>
+    </p:extLst>
+  </p:cSld>
+  <p:clrMapOvr>
+    <a:masterClrMapping/>
+  </p:clrMapOvr>
+</p:sld>
+</file>
+
+<file path=ppt/slides/slide22.xml><?xml version="1.0" encoding="utf-8"?>
+<p:sld xmlns:a="http://schemas.openxmlformats.org/drawingml/2006/main" xmlns:r="http://schemas.openxmlformats.org/officeDocument/2006/relationships" xmlns:p="http://schemas.openxmlformats.org/presentationml/2006/main">
+  <p:cSld>
+    <p:spTree>
+      <p:nvGrpSpPr>
+        <p:cNvPr id="1" name=""/>
+        <p:cNvGrpSpPr/>
+        <p:nvPr/>
+      </p:nvGrpSpPr>
+      <p:grpSpPr>
+        <a:xfrm>
+          <a:off x="0" y="0"/>
+          <a:ext cx="0" cy="0"/>
+          <a:chOff x="0" y="0"/>
+          <a:chExt cx="0" cy="0"/>
+        </a:xfrm>
+      </p:grpSpPr>
+      <p:pic>
+        <p:nvPicPr>
+          <p:cNvPr id="7" name="Picture 2" descr="Ensemble Methods in Machine Learning: Bagging Versus Boosting | Pluralsight">
+            <a:extLst>
+              <a:ext uri="{FF2B5EF4-FFF2-40B4-BE49-F238E27FC236}">
+                <a16:creationId xmlns:a16="http://schemas.microsoft.com/office/drawing/2014/main" id="{63DF4119-CDA4-D1D7-0C30-38F574C68CA2}"/>
+              </a:ext>
+            </a:extLst>
+          </p:cNvPr>
+          <p:cNvPicPr>
+            <a:picLocks noChangeAspect="1" noChangeArrowheads="1"/>
+          </p:cNvPicPr>
+          <p:nvPr/>
+        </p:nvPicPr>
+        <p:blipFill>
+          <a:blip r:embed="rId2">
+            <a:extLst>
+              <a:ext uri="{28A0092B-C50C-407E-A947-70E740481C1C}">
+                <a14:useLocalDpi xmlns:a14="http://schemas.microsoft.com/office/drawing/2010/main" val="0"/>
+              </a:ext>
+            </a:extLst>
+          </a:blip>
+          <a:srcRect/>
+          <a:stretch>
+            <a:fillRect/>
+          </a:stretch>
+        </p:blipFill>
+        <p:spPr bwMode="auto">
+          <a:xfrm>
+            <a:off x="5935990" y="2690112"/>
+            <a:ext cx="5674816" cy="3255224"/>
+          </a:xfrm>
+          <a:prstGeom prst="rect">
+            <a:avLst/>
+          </a:prstGeom>
+          <a:noFill/>
+          <a:extLst>
+            <a:ext uri="{909E8E84-426E-40DD-AFC4-6F175D3DCCD1}">
+              <a14:hiddenFill xmlns:a14="http://schemas.microsoft.com/office/drawing/2010/main">
+                <a:solidFill>
+                  <a:srgbClr val="FFFFFF"/>
+                </a:solidFill>
+              </a14:hiddenFill>
+            </a:ext>
+          </a:extLst>
+        </p:spPr>
+      </p:pic>
+      <p:sp>
+        <p:nvSpPr>
+          <p:cNvPr id="2" name="Marcador de Posição do Número do Diapositivo 1">
+            <a:extLst>
+              <a:ext uri="{FF2B5EF4-FFF2-40B4-BE49-F238E27FC236}">
+                <a16:creationId xmlns:a16="http://schemas.microsoft.com/office/drawing/2014/main" id="{9C448F08-AE35-AC87-F203-23F7D7B8E6B3}"/>
+              </a:ext>
+            </a:extLst>
+          </p:cNvPr>
+          <p:cNvSpPr>
+            <a:spLocks noGrp="1"/>
+          </p:cNvSpPr>
+          <p:nvPr>
+            <p:ph type="sldNum" sz="quarter" idx="12"/>
+          </p:nvPr>
+        </p:nvSpPr>
+        <p:spPr/>
+        <p:txBody>
+          <a:bodyPr/>
+          <a:lstStyle/>
+          <a:p>
+            <a:pPr rtl="0"/>
+            <a:fld id="{F603CDE5-C1D8-4EDD-870F-A498BAFA520F}" type="slidenum">
+              <a:rPr lang="pt-PT" noProof="0" smtClean="0"/>
+              <a:t>22</a:t>
+            </a:fld>
+            <a:endParaRPr lang="pt-PT" noProof="0"/>
+          </a:p>
+        </p:txBody>
+      </p:sp>
+      <p:sp>
+        <p:nvSpPr>
+          <p:cNvPr id="3" name="Marcador de Posição do Rodapé 2">
+            <a:extLst>
+              <a:ext uri="{FF2B5EF4-FFF2-40B4-BE49-F238E27FC236}">
+                <a16:creationId xmlns:a16="http://schemas.microsoft.com/office/drawing/2014/main" id="{20E17078-2635-B6C6-1C8A-CAABA3039C85}"/>
+              </a:ext>
+            </a:extLst>
+          </p:cNvPr>
+          <p:cNvSpPr>
+            <a:spLocks noGrp="1"/>
+          </p:cNvSpPr>
+          <p:nvPr>
+            <p:ph type="ftr" sz="quarter" idx="11"/>
+          </p:nvPr>
+        </p:nvSpPr>
+        <p:spPr/>
+        <p:txBody>
+          <a:bodyPr/>
+          <a:lstStyle/>
+          <a:p>
+            <a:r>
+              <a:rPr lang="en-US" noProof="0" dirty="0"/>
+              <a:t>Machine Learning Development with Python</a:t>
+            </a:r>
+            <a:endParaRPr lang="pt-PT" noProof="0" dirty="0"/>
+          </a:p>
+        </p:txBody>
+      </p:sp>
+      <p:sp>
+        <p:nvSpPr>
+          <p:cNvPr id="4" name="Título 3">
+            <a:extLst>
+              <a:ext uri="{FF2B5EF4-FFF2-40B4-BE49-F238E27FC236}">
+                <a16:creationId xmlns:a16="http://schemas.microsoft.com/office/drawing/2014/main" id="{07CE9088-B8FA-2230-8155-33315E9C00F3}"/>
+              </a:ext>
+            </a:extLst>
+          </p:cNvPr>
+          <p:cNvSpPr>
+            <a:spLocks noGrp="1"/>
+          </p:cNvSpPr>
+          <p:nvPr>
+            <p:ph type="title"/>
+          </p:nvPr>
+        </p:nvSpPr>
+        <p:spPr/>
+        <p:txBody>
+          <a:bodyPr/>
+          <a:lstStyle/>
+          <a:p>
+            <a:r>
+              <a:rPr lang="pt-PT" i="1" dirty="0"/>
+              <a:t>Ensemble learning: </a:t>
+            </a:r>
+            <a:r>
+              <a:rPr lang="pt-PT" i="1" dirty="0" err="1"/>
+              <a:t>bagging</a:t>
+            </a:r>
+            <a:r>
+              <a:rPr lang="pt-PT" i="1" dirty="0"/>
+              <a:t> &amp; boosting</a:t>
+            </a:r>
+            <a:endParaRPr lang="pt-PT" dirty="0"/>
+          </a:p>
+        </p:txBody>
+      </p:sp>
+      <p:sp>
+        <p:nvSpPr>
+          <p:cNvPr id="5" name="Marcador de Posição do Texto 4">
+            <a:extLst>
+              <a:ext uri="{FF2B5EF4-FFF2-40B4-BE49-F238E27FC236}">
+                <a16:creationId xmlns:a16="http://schemas.microsoft.com/office/drawing/2014/main" id="{7B687AD8-CC73-922C-A5D1-6853D752B537}"/>
+              </a:ext>
+            </a:extLst>
+          </p:cNvPr>
+          <p:cNvSpPr>
+            <a:spLocks noGrp="1"/>
+          </p:cNvSpPr>
+          <p:nvPr>
+            <p:ph type="body" idx="1"/>
+          </p:nvPr>
+        </p:nvSpPr>
+        <p:spPr/>
+        <p:txBody>
+          <a:bodyPr/>
+          <a:lstStyle/>
+          <a:p>
+            <a:r>
+              <a:rPr lang="pt-PT" dirty="0"/>
+              <a:t>Boosting</a:t>
+            </a:r>
+          </a:p>
+        </p:txBody>
+      </p:sp>
+      <p:sp>
+        <p:nvSpPr>
+          <p:cNvPr id="6" name="Marcador de Posição de Conteúdo 5">
+            <a:extLst>
+              <a:ext uri="{FF2B5EF4-FFF2-40B4-BE49-F238E27FC236}">
+                <a16:creationId xmlns:a16="http://schemas.microsoft.com/office/drawing/2014/main" id="{72B598D9-E7B8-17AA-8B64-DC76C3DD318E}"/>
+              </a:ext>
+            </a:extLst>
+          </p:cNvPr>
+          <p:cNvSpPr>
+            <a:spLocks noGrp="1"/>
+          </p:cNvSpPr>
+          <p:nvPr>
+            <p:ph sz="half" idx="2"/>
+          </p:nvPr>
+        </p:nvSpPr>
+        <p:spPr>
+          <a:xfrm>
+            <a:off x="581194" y="2926051"/>
+            <a:ext cx="5393100" cy="3255223"/>
+          </a:xfrm>
+        </p:spPr>
+        <p:txBody>
+          <a:bodyPr>
+            <a:normAutofit/>
+          </a:bodyPr>
+          <a:lstStyle/>
+          <a:p>
+            <a:r>
+              <a:rPr lang="pt-PT" dirty="0"/>
+              <a:t>Treinamos um modelo no conjunto de treino e calculamos o seu resíduo (valor real – estimado). Em seguida, no mesmo conjunto, treinamos um novo modelo que vai prever o resíduo do modelo anterior.</a:t>
+            </a:r>
+          </a:p>
+          <a:p>
+            <a:r>
+              <a:rPr lang="pt-PT" dirty="0"/>
+              <a:t>A previsão final será a soma das previsões dos modelos.</a:t>
+            </a:r>
+          </a:p>
+          <a:p>
+            <a:r>
+              <a:rPr lang="pt-PT" dirty="0"/>
+              <a:t>Exemplo: </a:t>
+            </a:r>
+            <a:r>
+              <a:rPr lang="pt-PT" dirty="0" err="1"/>
+              <a:t>GBMs</a:t>
+            </a:r>
+            <a:r>
+              <a:rPr lang="pt-PT" dirty="0"/>
+              <a:t> (</a:t>
+            </a:r>
+            <a:r>
+              <a:rPr lang="pt-PT" i="1" dirty="0" err="1"/>
+              <a:t>Gradient</a:t>
+            </a:r>
+            <a:r>
+              <a:rPr lang="pt-PT" i="1" dirty="0"/>
+              <a:t> Boosting </a:t>
+            </a:r>
+            <a:r>
+              <a:rPr lang="pt-PT" i="1" dirty="0" err="1"/>
+              <a:t>Machines</a:t>
+            </a:r>
+            <a:r>
+              <a:rPr lang="pt-PT" dirty="0"/>
+              <a:t>), como </a:t>
+            </a:r>
+            <a:r>
+              <a:rPr lang="pt-PT" i="1" dirty="0" err="1"/>
+              <a:t>LightGBM</a:t>
+            </a:r>
+            <a:r>
+              <a:rPr lang="pt-PT" i="1" dirty="0"/>
+              <a:t> </a:t>
+            </a:r>
+            <a:r>
+              <a:rPr lang="pt-PT" dirty="0"/>
+              <a:t>ou </a:t>
+            </a:r>
+            <a:r>
+              <a:rPr lang="pt-PT" i="1" dirty="0" err="1"/>
+              <a:t>XGBoost</a:t>
+            </a:r>
+            <a:r>
+              <a:rPr lang="pt-PT" dirty="0"/>
+              <a:t>.</a:t>
+            </a:r>
+          </a:p>
+        </p:txBody>
+      </p:sp>
+    </p:spTree>
+    <p:extLst>
+      <p:ext uri="{BB962C8B-B14F-4D97-AF65-F5344CB8AC3E}">
+        <p14:creationId xmlns:p14="http://schemas.microsoft.com/office/powerpoint/2010/main" val="3015877416"/>
+      </p:ext>
+    </p:extLst>
+  </p:cSld>
+  <p:clrMapOvr>
+    <a:masterClrMapping/>
+  </p:clrMapOvr>
+</p:sld>
+</file>
+
+<file path=ppt/slides/slide23.xml><?xml version="1.0" encoding="utf-8"?>
+<p:sld xmlns:a="http://schemas.openxmlformats.org/drawingml/2006/main" xmlns:r="http://schemas.openxmlformats.org/officeDocument/2006/relationships" xmlns:p="http://schemas.openxmlformats.org/presentationml/2006/main">
+  <p:cSld>
+    <p:spTree>
+      <p:nvGrpSpPr>
+        <p:cNvPr id="1" name=""/>
+        <p:cNvGrpSpPr/>
+        <p:nvPr/>
+      </p:nvGrpSpPr>
+      <p:grpSpPr>
+        <a:xfrm>
+          <a:off x="0" y="0"/>
+          <a:ext cx="0" cy="0"/>
+          <a:chOff x="0" y="0"/>
+          <a:chExt cx="0" cy="0"/>
+        </a:xfrm>
+      </p:grpSpPr>
+      <p:sp>
+        <p:nvSpPr>
+          <p:cNvPr id="2" name="Marcador de Posição do Número do Diapositivo 1">
+            <a:extLst>
+              <a:ext uri="{FF2B5EF4-FFF2-40B4-BE49-F238E27FC236}">
+                <a16:creationId xmlns:a16="http://schemas.microsoft.com/office/drawing/2014/main" id="{9C448F08-AE35-AC87-F203-23F7D7B8E6B3}"/>
+              </a:ext>
+            </a:extLst>
+          </p:cNvPr>
+          <p:cNvSpPr>
+            <a:spLocks noGrp="1"/>
+          </p:cNvSpPr>
+          <p:nvPr>
+            <p:ph type="sldNum" sz="quarter" idx="12"/>
+          </p:nvPr>
+        </p:nvSpPr>
+        <p:spPr/>
+        <p:txBody>
+          <a:bodyPr/>
+          <a:lstStyle/>
+          <a:p>
+            <a:pPr rtl="0"/>
+            <a:fld id="{F603CDE5-C1D8-4EDD-870F-A498BAFA520F}" type="slidenum">
+              <a:rPr lang="pt-PT" noProof="0" smtClean="0"/>
+              <a:t>23</a:t>
+            </a:fld>
+            <a:endParaRPr lang="pt-PT" noProof="0"/>
+          </a:p>
+        </p:txBody>
+      </p:sp>
+      <p:sp>
+        <p:nvSpPr>
+          <p:cNvPr id="3" name="Marcador de Posição do Rodapé 2">
+            <a:extLst>
+              <a:ext uri="{FF2B5EF4-FFF2-40B4-BE49-F238E27FC236}">
+                <a16:creationId xmlns:a16="http://schemas.microsoft.com/office/drawing/2014/main" id="{20E17078-2635-B6C6-1C8A-CAABA3039C85}"/>
+              </a:ext>
+            </a:extLst>
+          </p:cNvPr>
+          <p:cNvSpPr>
+            <a:spLocks noGrp="1"/>
+          </p:cNvSpPr>
+          <p:nvPr>
+            <p:ph type="ftr" sz="quarter" idx="11"/>
+          </p:nvPr>
+        </p:nvSpPr>
+        <p:spPr/>
+        <p:txBody>
+          <a:bodyPr/>
+          <a:lstStyle/>
+          <a:p>
+            <a:r>
+              <a:rPr lang="en-US" noProof="0" dirty="0"/>
+              <a:t>Machine Learning Development with Python</a:t>
+            </a:r>
+            <a:endParaRPr lang="pt-PT" noProof="0" dirty="0"/>
+          </a:p>
+        </p:txBody>
+      </p:sp>
+      <p:sp>
+        <p:nvSpPr>
+          <p:cNvPr id="4" name="Título 3">
+            <a:extLst>
+              <a:ext uri="{FF2B5EF4-FFF2-40B4-BE49-F238E27FC236}">
+                <a16:creationId xmlns:a16="http://schemas.microsoft.com/office/drawing/2014/main" id="{07CE9088-B8FA-2230-8155-33315E9C00F3}"/>
+              </a:ext>
+            </a:extLst>
+          </p:cNvPr>
+          <p:cNvSpPr>
+            <a:spLocks noGrp="1"/>
+          </p:cNvSpPr>
+          <p:nvPr>
+            <p:ph type="title"/>
+          </p:nvPr>
+        </p:nvSpPr>
+        <p:spPr/>
+        <p:txBody>
+          <a:bodyPr/>
+          <a:lstStyle/>
+          <a:p>
+            <a:r>
+              <a:rPr lang="pt-PT" i="1" dirty="0"/>
+              <a:t>Como Descobrir </a:t>
+            </a:r>
+            <a:r>
+              <a:rPr lang="pt-PT" i="1" dirty="0" err="1"/>
+              <a:t>Hiperparâmetros</a:t>
+            </a:r>
+            <a:endParaRPr lang="pt-PT" dirty="0"/>
+          </a:p>
+        </p:txBody>
+      </p:sp>
+      <p:sp>
+        <p:nvSpPr>
+          <p:cNvPr id="5" name="Marcador de Posição do Texto 4">
+            <a:extLst>
+              <a:ext uri="{FF2B5EF4-FFF2-40B4-BE49-F238E27FC236}">
+                <a16:creationId xmlns:a16="http://schemas.microsoft.com/office/drawing/2014/main" id="{7B687AD8-CC73-922C-A5D1-6853D752B537}"/>
+              </a:ext>
+            </a:extLst>
+          </p:cNvPr>
+          <p:cNvSpPr>
+            <a:spLocks noGrp="1"/>
+          </p:cNvSpPr>
+          <p:nvPr>
+            <p:ph type="body" idx="1"/>
+          </p:nvPr>
+        </p:nvSpPr>
+        <p:spPr/>
+        <p:txBody>
+          <a:bodyPr/>
+          <a:lstStyle/>
+          <a:p>
+            <a:r>
+              <a:rPr lang="pt-PT" dirty="0"/>
+              <a:t>Cross </a:t>
+            </a:r>
+            <a:r>
+              <a:rPr lang="pt-PT" dirty="0" err="1"/>
+              <a:t>Validation</a:t>
+            </a:r>
+            <a:endParaRPr lang="pt-PT" dirty="0"/>
+          </a:p>
+        </p:txBody>
+      </p:sp>
+      <p:sp>
+        <p:nvSpPr>
+          <p:cNvPr id="6" name="Marcador de Posição de Conteúdo 5">
+            <a:extLst>
+              <a:ext uri="{FF2B5EF4-FFF2-40B4-BE49-F238E27FC236}">
+                <a16:creationId xmlns:a16="http://schemas.microsoft.com/office/drawing/2014/main" id="{72B598D9-E7B8-17AA-8B64-DC76C3DD318E}"/>
+              </a:ext>
+            </a:extLst>
+          </p:cNvPr>
+          <p:cNvSpPr>
+            <a:spLocks noGrp="1"/>
+          </p:cNvSpPr>
+          <p:nvPr>
+            <p:ph sz="half" idx="2"/>
+          </p:nvPr>
+        </p:nvSpPr>
+        <p:spPr>
+          <a:xfrm>
+            <a:off x="581194" y="2926051"/>
+            <a:ext cx="5393100" cy="3255223"/>
+          </a:xfrm>
+        </p:spPr>
+        <p:txBody>
+          <a:bodyPr>
+            <a:normAutofit/>
+          </a:bodyPr>
+          <a:lstStyle/>
+          <a:p>
+            <a:r>
+              <a:rPr lang="pt-PT" dirty="0"/>
+              <a:t>Dividimos o conjunto de treino em </a:t>
+            </a:r>
+            <a:r>
+              <a:rPr lang="pt-PT" i="1" dirty="0"/>
+              <a:t>n </a:t>
+            </a:r>
+            <a:r>
+              <a:rPr lang="pt-PT" dirty="0"/>
+              <a:t>partes iguais.</a:t>
+            </a:r>
+          </a:p>
+          <a:p>
+            <a:r>
+              <a:rPr lang="pt-PT" dirty="0"/>
+              <a:t>Treinamos </a:t>
+            </a:r>
+            <a:r>
+              <a:rPr lang="pt-PT" i="1" dirty="0"/>
+              <a:t>n </a:t>
+            </a:r>
+            <a:r>
+              <a:rPr lang="pt-PT" dirty="0"/>
+              <a:t>modelos, onde, no 1º, deixamos a 1ª parte fora, no 2º deixamos a 2ª,…</a:t>
+            </a:r>
+          </a:p>
+          <a:p>
+            <a:r>
+              <a:rPr lang="pt-PT" dirty="0"/>
+              <a:t>Avaliamos o desempenho de cada modelo na parte deixada de fora e calculamos a média da medida de desempenho.</a:t>
+            </a:r>
+          </a:p>
+        </p:txBody>
+      </p:sp>
+      <p:pic>
+        <p:nvPicPr>
+          <p:cNvPr id="2050" name="Picture 2" descr="Cross-Validation: K Fold vs Monte Carlo | by Rebecca Patro | Towards Data  Science">
+            <a:extLst>
+              <a:ext uri="{FF2B5EF4-FFF2-40B4-BE49-F238E27FC236}">
+                <a16:creationId xmlns:a16="http://schemas.microsoft.com/office/drawing/2014/main" id="{286164FE-74F0-2A0A-CC2A-BDFE8EB7ABA3}"/>
+              </a:ext>
+            </a:extLst>
+          </p:cNvPr>
+          <p:cNvPicPr>
+            <a:picLocks noChangeAspect="1" noChangeArrowheads="1"/>
+          </p:cNvPicPr>
+          <p:nvPr/>
+        </p:nvPicPr>
+        <p:blipFill>
+          <a:blip r:embed="rId2">
+            <a:extLst>
+              <a:ext uri="{28A0092B-C50C-407E-A947-70E740481C1C}">
+                <a14:useLocalDpi xmlns:a14="http://schemas.microsoft.com/office/drawing/2010/main" val="0"/>
+              </a:ext>
+            </a:extLst>
+          </a:blip>
+          <a:srcRect/>
+          <a:stretch>
+            <a:fillRect/>
+          </a:stretch>
+        </p:blipFill>
+        <p:spPr bwMode="auto">
+          <a:xfrm>
+            <a:off x="6412098" y="2988128"/>
+            <a:ext cx="5435775" cy="2437039"/>
+          </a:xfrm>
+          <a:prstGeom prst="rect">
+            <a:avLst/>
+          </a:prstGeom>
+          <a:noFill/>
+          <a:extLst>
+            <a:ext uri="{909E8E84-426E-40DD-AFC4-6F175D3DCCD1}">
+              <a14:hiddenFill xmlns:a14="http://schemas.microsoft.com/office/drawing/2010/main">
+                <a:solidFill>
+                  <a:srgbClr val="FFFFFF"/>
+                </a:solidFill>
+              </a14:hiddenFill>
+            </a:ext>
+          </a:extLst>
+        </p:spPr>
+      </p:pic>
+    </p:spTree>
+    <p:extLst>
+      <p:ext uri="{BB962C8B-B14F-4D97-AF65-F5344CB8AC3E}">
+        <p14:creationId xmlns:p14="http://schemas.microsoft.com/office/powerpoint/2010/main" val="4213024939"/>
+      </p:ext>
+    </p:extLst>
+  </p:cSld>
+  <p:clrMapOvr>
+    <a:masterClrMapping/>
+  </p:clrMapOvr>
+</p:sld>
+</file>
+
+<file path=ppt/slides/slide24.xml><?xml version="1.0" encoding="utf-8"?>
+<p:sld xmlns:a="http://schemas.openxmlformats.org/drawingml/2006/main" xmlns:r="http://schemas.openxmlformats.org/officeDocument/2006/relationships" xmlns:p="http://schemas.openxmlformats.org/presentationml/2006/main">
+  <p:cSld>
+    <p:spTree>
+      <p:nvGrpSpPr>
+        <p:cNvPr id="1" name=""/>
+        <p:cNvGrpSpPr/>
+        <p:nvPr/>
+      </p:nvGrpSpPr>
+      <p:grpSpPr>
+        <a:xfrm>
+          <a:off x="0" y="0"/>
+          <a:ext cx="0" cy="0"/>
+          <a:chOff x="0" y="0"/>
+          <a:chExt cx="0" cy="0"/>
+        </a:xfrm>
+      </p:grpSpPr>
+      <p:sp>
+        <p:nvSpPr>
+          <p:cNvPr id="5" name="Marcador de Posição do Número do Diapositivo 4">
+            <a:extLst>
+              <a:ext uri="{FF2B5EF4-FFF2-40B4-BE49-F238E27FC236}">
+                <a16:creationId xmlns:a16="http://schemas.microsoft.com/office/drawing/2014/main" id="{3FD45999-342A-6E84-C532-DF49E8B49CC5}"/>
+              </a:ext>
+            </a:extLst>
+          </p:cNvPr>
+          <p:cNvSpPr>
+            <a:spLocks noGrp="1"/>
+          </p:cNvSpPr>
+          <p:nvPr>
+            <p:ph type="sldNum" sz="quarter" idx="12"/>
+          </p:nvPr>
+        </p:nvSpPr>
+        <p:spPr/>
+        <p:txBody>
+          <a:bodyPr/>
+          <a:lstStyle/>
+          <a:p>
+            <a:pPr rtl="0"/>
             <a:fld id="{159F479D-7533-4EEF-A06F-7CD2FE3DB90D}" type="slidenum">
               <a:rPr lang="pt-PT" noProof="0" smtClean="0"/>
-              <a:t>21</a:t>
+              <a:t>24</a:t>
             </a:fld>
             <a:endParaRPr lang="pt-PT" noProof="0"/>
           </a:p>

</xml_diff>